<commit_message>
Update the powerpoint file
</commit_message>
<xml_diff>
--- a/Tips and Snippets/Data Storage/Using Content Provider/Content Provider.pptx
+++ b/Tips and Snippets/Data Storage/Using Content Provider/Content Provider.pptx
@@ -8,6 +8,8 @@
     <p:sldId id="256" r:id="rId2"/>
     <p:sldId id="257" r:id="rId3"/>
     <p:sldId id="258" r:id="rId4"/>
+    <p:sldId id="259" r:id="rId5"/>
+    <p:sldId id="260" r:id="rId6"/>
   </p:sldIdLst>
   <p:sldSz cx="12192000" cy="6858000"/>
   <p:notesSz cx="6858000" cy="9144000"/>
@@ -3961,8 +3963,8 @@
         </p:nvSpPr>
         <p:spPr bwMode="auto">
           <a:xfrm>
-            <a:off x="0" y="1759187"/>
-            <a:ext cx="11976846" cy="2123658"/>
+            <a:off x="0" y="1482189"/>
+            <a:ext cx="11976846" cy="2677656"/>
           </a:xfrm>
           <a:prstGeom prst="rect">
             <a:avLst/>
@@ -4635,6 +4637,61 @@
             </a:r>
           </a:p>
           <a:p>
+            <a:pPr lvl="0" eaLnBrk="0" fontAlgn="base" hangingPunct="0">
+              <a:lnSpc>
+                <a:spcPct val="100000"/>
+              </a:lnSpc>
+              <a:spcBef>
+                <a:spcPct val="0"/>
+              </a:spcBef>
+              <a:spcAft>
+                <a:spcPct val="0"/>
+              </a:spcAft>
+            </a:pPr>
+            <a:r>
+              <a:rPr lang="fr-FR" sz="1800" dirty="0" smtClean="0"/>
+              <a:t>Initialiser </a:t>
+            </a:r>
+            <a:r>
+              <a:rPr lang="fr-FR" sz="1800" dirty="0"/>
+              <a:t>les URI potentiels, avec  </a:t>
+            </a:r>
+            <a:r>
+              <a:rPr lang="fr-FR" sz="1800" b="1" dirty="0"/>
+              <a:t>ELTS</a:t>
+            </a:r>
+            <a:r>
+              <a:rPr lang="fr-FR" sz="1800" dirty="0"/>
+              <a:t> pour une liste d’éléments (résultat d’un SELECT) et </a:t>
+            </a:r>
+            <a:r>
+              <a:rPr lang="fr-FR" sz="1800" b="1" dirty="0"/>
+              <a:t>ELT_ID</a:t>
+            </a:r>
+            <a:r>
+              <a:rPr lang="fr-FR" sz="1800" dirty="0"/>
+              <a:t> pour un élément unique (supprimer ou modifier un élément spécifique</a:t>
+            </a:r>
+            <a:r>
+              <a:rPr lang="fr-FR" sz="1800" dirty="0" smtClean="0"/>
+              <a:t>).</a:t>
+            </a:r>
+          </a:p>
+          <a:p>
+            <a:pPr lvl="0" eaLnBrk="0" fontAlgn="base" hangingPunct="0">
+              <a:lnSpc>
+                <a:spcPct val="100000"/>
+              </a:lnSpc>
+              <a:spcBef>
+                <a:spcPct val="0"/>
+              </a:spcBef>
+              <a:spcAft>
+                <a:spcPct val="0"/>
+              </a:spcAft>
+            </a:pPr>
+            <a:endParaRPr lang="fr-FR" sz="1800" dirty="0"/>
+          </a:p>
+          <a:p>
             <a:pPr marL="0" lvl="0" indent="0" eaLnBrk="0" fontAlgn="base" hangingPunct="0">
               <a:lnSpc>
                 <a:spcPct val="100000"/>
@@ -4648,39 +4705,14 @@
               <a:buNone/>
             </a:pPr>
             <a:r>
-              <a:rPr lang="fr-FR" sz="1600" dirty="0" smtClean="0">
-                <a:solidFill>
-                  <a:srgbClr val="A9B7C6"/>
-                </a:solidFill>
-                <a:latin typeface="Courier New" panose="02070309020205020404" pitchFamily="49" charset="0"/>
-                <a:cs typeface="Courier New" panose="02070309020205020404" pitchFamily="49" charset="0"/>
-              </a:rPr>
-              <a:t>* </a:t>
-            </a:r>
-            <a:r>
               <a:rPr lang="fr-FR" sz="1800" dirty="0" smtClean="0"/>
-              <a:t>Initialiser </a:t>
-            </a:r>
-            <a:r>
-              <a:rPr lang="fr-FR" sz="1800" dirty="0"/>
-              <a:t>les URI potentiels, avec  </a:t>
-            </a:r>
-            <a:r>
-              <a:rPr lang="fr-FR" sz="1800" b="1" dirty="0"/>
-              <a:t>ELTS</a:t>
-            </a:r>
-            <a:r>
-              <a:rPr lang="fr-FR" sz="1800" dirty="0"/>
-              <a:t> pour une liste d’éléments (résultat d’un SELECT) et </a:t>
-            </a:r>
-            <a:r>
-              <a:rPr lang="fr-FR" sz="1800" b="1" dirty="0"/>
-              <a:t>ELT_ID</a:t>
-            </a:r>
-            <a:r>
-              <a:rPr lang="fr-FR" sz="1800" dirty="0"/>
-              <a:t> pour un élément unique (supprimer ou modifier un élément spécifique).</a:t>
-            </a:r>
+              <a:t>// TODO :</a:t>
+            </a:r>
+            <a:r>
+              <a:rPr lang="fr-FR" sz="1800" smtClean="0"/>
+              <a:t>ContentResolver</a:t>
+            </a:r>
+            <a:endParaRPr lang="fr-FR" sz="1800" dirty="0"/>
           </a:p>
         </p:txBody>
       </p:sp>
@@ -4701,6 +4733,163 @@
       </p:par>
     </p:tnLst>
   </p:timing>
+</p:sld>
+</file>
+
+<file path=ppt/slides/slide4.xml><?xml version="1.0" encoding="utf-8"?>
+<p:sld xmlns:a="http://schemas.openxmlformats.org/drawingml/2006/main" xmlns:r="http://schemas.openxmlformats.org/officeDocument/2006/relationships" xmlns:p="http://schemas.openxmlformats.org/presentationml/2006/main">
+  <p:cSld>
+    <p:spTree>
+      <p:nvGrpSpPr>
+        <p:cNvPr id="1" name=""/>
+        <p:cNvGrpSpPr/>
+        <p:nvPr/>
+      </p:nvGrpSpPr>
+      <p:grpSpPr>
+        <a:xfrm>
+          <a:off x="0" y="0"/>
+          <a:ext cx="0" cy="0"/>
+          <a:chOff x="0" y="0"/>
+          <a:chExt cx="0" cy="0"/>
+        </a:xfrm>
+      </p:grpSpPr>
+      <p:sp>
+        <p:nvSpPr>
+          <p:cNvPr id="2" name="Titre 1"/>
+          <p:cNvSpPr>
+            <a:spLocks noGrp="1"/>
+          </p:cNvSpPr>
+          <p:nvPr>
+            <p:ph type="title"/>
+          </p:nvPr>
+        </p:nvSpPr>
+        <p:spPr/>
+        <p:txBody>
+          <a:bodyPr/>
+          <a:lstStyle/>
+          <a:p>
+            <a:endParaRPr lang="fr-FR"/>
+          </a:p>
+        </p:txBody>
+      </p:sp>
+      <p:pic>
+        <p:nvPicPr>
+          <p:cNvPr id="4" name="Espace réservé du contenu 3"/>
+          <p:cNvPicPr>
+            <a:picLocks noGrp="1" noChangeAspect="1"/>
+          </p:cNvPicPr>
+          <p:nvPr>
+            <p:ph idx="1"/>
+          </p:nvPr>
+        </p:nvPicPr>
+        <p:blipFill>
+          <a:blip r:embed="rId2">
+            <a:extLst>
+              <a:ext uri="{28A0092B-C50C-407E-A947-70E740481C1C}">
+                <a14:useLocalDpi xmlns:a14="http://schemas.microsoft.com/office/drawing/2010/main" val="0"/>
+              </a:ext>
+            </a:extLst>
+          </a:blip>
+          <a:stretch>
+            <a:fillRect/>
+          </a:stretch>
+        </p:blipFill>
+        <p:spPr>
+          <a:xfrm>
+            <a:off x="3238500" y="2586831"/>
+            <a:ext cx="5715000" cy="2828925"/>
+          </a:xfrm>
+        </p:spPr>
+      </p:pic>
+    </p:spTree>
+    <p:extLst>
+      <p:ext uri="{BB962C8B-B14F-4D97-AF65-F5344CB8AC3E}">
+        <p14:creationId xmlns:p14="http://schemas.microsoft.com/office/powerpoint/2010/main" val="637060425"/>
+      </p:ext>
+    </p:extLst>
+  </p:cSld>
+  <p:clrMapOvr>
+    <a:masterClrMapping/>
+  </p:clrMapOvr>
+</p:sld>
+</file>
+
+<file path=ppt/slides/slide5.xml><?xml version="1.0" encoding="utf-8"?>
+<p:sld xmlns:a="http://schemas.openxmlformats.org/drawingml/2006/main" xmlns:r="http://schemas.openxmlformats.org/officeDocument/2006/relationships" xmlns:p="http://schemas.openxmlformats.org/presentationml/2006/main">
+  <p:cSld>
+    <p:spTree>
+      <p:nvGrpSpPr>
+        <p:cNvPr id="1" name=""/>
+        <p:cNvGrpSpPr/>
+        <p:nvPr/>
+      </p:nvGrpSpPr>
+      <p:grpSpPr>
+        <a:xfrm>
+          <a:off x="0" y="0"/>
+          <a:ext cx="0" cy="0"/>
+          <a:chOff x="0" y="0"/>
+          <a:chExt cx="0" cy="0"/>
+        </a:xfrm>
+      </p:grpSpPr>
+      <p:sp>
+        <p:nvSpPr>
+          <p:cNvPr id="2" name="Titre 1"/>
+          <p:cNvSpPr>
+            <a:spLocks noGrp="1"/>
+          </p:cNvSpPr>
+          <p:nvPr>
+            <p:ph type="title"/>
+          </p:nvPr>
+        </p:nvSpPr>
+        <p:spPr/>
+        <p:txBody>
+          <a:bodyPr/>
+          <a:lstStyle/>
+          <a:p>
+            <a:endParaRPr lang="fr-FR"/>
+          </a:p>
+        </p:txBody>
+      </p:sp>
+      <p:pic>
+        <p:nvPicPr>
+          <p:cNvPr id="4" name="Image 3"/>
+          <p:cNvPicPr>
+            <a:picLocks noChangeAspect="1"/>
+          </p:cNvPicPr>
+          <p:nvPr/>
+        </p:nvPicPr>
+        <p:blipFill>
+          <a:blip r:embed="rId2">
+            <a:extLst>
+              <a:ext uri="{28A0092B-C50C-407E-A947-70E740481C1C}">
+                <a14:useLocalDpi xmlns:a14="http://schemas.microsoft.com/office/drawing/2010/main" val="0"/>
+              </a:ext>
+            </a:extLst>
+          </a:blip>
+          <a:stretch>
+            <a:fillRect/>
+          </a:stretch>
+        </p:blipFill>
+        <p:spPr>
+          <a:xfrm>
+            <a:off x="1990720" y="2231651"/>
+            <a:ext cx="7819150" cy="3631266"/>
+          </a:xfrm>
+          <a:prstGeom prst="rect">
+            <a:avLst/>
+          </a:prstGeom>
+        </p:spPr>
+      </p:pic>
+    </p:spTree>
+    <p:extLst>
+      <p:ext uri="{BB962C8B-B14F-4D97-AF65-F5344CB8AC3E}">
+        <p14:creationId xmlns:p14="http://schemas.microsoft.com/office/powerpoint/2010/main" val="508566312"/>
+      </p:ext>
+    </p:extLst>
+  </p:cSld>
+  <p:clrMapOvr>
+    <a:masterClrMapping/>
+  </p:clrMapOvr>
 </p:sld>
 </file>
 

</xml_diff>